<commit_message>
fixed typos in lecture 1
</commit_message>
<xml_diff>
--- a/resources/slides/Lec1.pptx
+++ b/resources/slides/Lec1.pptx
@@ -232,6 +232,11 @@
       </a:defRPr>
     </a:lvl9pPr>
   </p:defaultTextStyle>
+  <p:extLst>
+    <p:ext uri="{EFAFB233-063F-42B5-8137-9DF3F51BA10A}">
+      <p15:sldGuideLst xmlns:p15="http://schemas.microsoft.com/office/powerpoint/2012/main"/>
+    </p:ext>
+  </p:extLst>
 </p:presentation>
 </file>
 
@@ -14174,7 +14179,19 @@
             </a:pPr>
             <a:r>
               <a:rPr lang="en" dirty="0"/>
-              <a:t>Agile method doing requirements analysis.  </a:t>
+              <a:t>Agile method </a:t>
+            </a:r>
+            <a:r>
+              <a:rPr lang="en-US" dirty="0" smtClean="0"/>
+              <a:t>of </a:t>
+            </a:r>
+            <a:r>
+              <a:rPr lang="en" dirty="0" smtClean="0"/>
+              <a:t>doing </a:t>
+            </a:r>
+            <a:r>
+              <a:rPr lang="en" dirty="0"/>
+              <a:t>requirements analysis.  </a:t>
             </a:r>
             <a:endParaRPr dirty="0"/>
           </a:p>
@@ -14510,8 +14527,12 @@
               <a:buNone/>
             </a:pPr>
             <a:r>
+              <a:rPr lang="en" dirty="0" smtClean="0"/>
+              <a:t>Use </a:t>
+            </a:r>
+            <a:r>
               <a:rPr lang="en" dirty="0"/>
-              <a:t>User the simplest tools (or no tools at all).</a:t>
+              <a:t>the simplest tools (or no tools at all).</a:t>
             </a:r>
             <a:endParaRPr dirty="0"/>
           </a:p>
@@ -16860,7 +16881,7 @@
         </p:nvGraphicFramePr>
         <p:xfrm>
           <a:off x="952500" y="1645275"/>
-          <a:ext cx="7239000" cy="4362293"/>
+          <a:ext cx="7239000" cy="4389090"/>
         </p:xfrm>
         <a:graphic>
           <a:graphicData uri="http://schemas.openxmlformats.org/drawingml/2006/table">

</xml_diff>